<commit_message>
add softkappa and wmd
</commit_message>
<xml_diff>
--- a/Doc/FlowChart.pptx
+++ b/Doc/FlowChart.pptx
@@ -289,7 +289,7 @@
             <a:fld id="{530820CF-B880-4189-942D-D702A7CBA730}" type="datetimeFigureOut">
               <a:rPr lang="zh-CN" altLang="en-US" smtClean="0"/>
               <a:pPr/>
-              <a:t>2015/7/12</a:t>
+              <a:t>2015/7/13</a:t>
             </a:fld>
             <a:endParaRPr lang="zh-CN" altLang="en-US"/>
           </a:p>
@@ -456,7 +456,7 @@
             <a:fld id="{530820CF-B880-4189-942D-D702A7CBA730}" type="datetimeFigureOut">
               <a:rPr lang="zh-CN" altLang="en-US" smtClean="0"/>
               <a:pPr/>
-              <a:t>2015/7/12</a:t>
+              <a:t>2015/7/13</a:t>
             </a:fld>
             <a:endParaRPr lang="zh-CN" altLang="en-US"/>
           </a:p>
@@ -633,7 +633,7 @@
             <a:fld id="{530820CF-B880-4189-942D-D702A7CBA730}" type="datetimeFigureOut">
               <a:rPr lang="zh-CN" altLang="en-US" smtClean="0"/>
               <a:pPr/>
-              <a:t>2015/7/12</a:t>
+              <a:t>2015/7/13</a:t>
             </a:fld>
             <a:endParaRPr lang="zh-CN" altLang="en-US"/>
           </a:p>
@@ -800,7 +800,7 @@
             <a:fld id="{530820CF-B880-4189-942D-D702A7CBA730}" type="datetimeFigureOut">
               <a:rPr lang="zh-CN" altLang="en-US" smtClean="0"/>
               <a:pPr/>
-              <a:t>2015/7/12</a:t>
+              <a:t>2015/7/13</a:t>
             </a:fld>
             <a:endParaRPr lang="zh-CN" altLang="en-US"/>
           </a:p>
@@ -1043,7 +1043,7 @@
             <a:fld id="{530820CF-B880-4189-942D-D702A7CBA730}" type="datetimeFigureOut">
               <a:rPr lang="zh-CN" altLang="en-US" smtClean="0"/>
               <a:pPr/>
-              <a:t>2015/7/12</a:t>
+              <a:t>2015/7/13</a:t>
             </a:fld>
             <a:endParaRPr lang="zh-CN" altLang="en-US"/>
           </a:p>
@@ -1328,7 +1328,7 @@
             <a:fld id="{530820CF-B880-4189-942D-D702A7CBA730}" type="datetimeFigureOut">
               <a:rPr lang="zh-CN" altLang="en-US" smtClean="0"/>
               <a:pPr/>
-              <a:t>2015/7/12</a:t>
+              <a:t>2015/7/13</a:t>
             </a:fld>
             <a:endParaRPr lang="zh-CN" altLang="en-US"/>
           </a:p>
@@ -1747,7 +1747,7 @@
             <a:fld id="{530820CF-B880-4189-942D-D702A7CBA730}" type="datetimeFigureOut">
               <a:rPr lang="zh-CN" altLang="en-US" smtClean="0"/>
               <a:pPr/>
-              <a:t>2015/7/12</a:t>
+              <a:t>2015/7/13</a:t>
             </a:fld>
             <a:endParaRPr lang="zh-CN" altLang="en-US"/>
           </a:p>
@@ -1862,7 +1862,7 @@
             <a:fld id="{530820CF-B880-4189-942D-D702A7CBA730}" type="datetimeFigureOut">
               <a:rPr lang="zh-CN" altLang="en-US" smtClean="0"/>
               <a:pPr/>
-              <a:t>2015/7/12</a:t>
+              <a:t>2015/7/13</a:t>
             </a:fld>
             <a:endParaRPr lang="zh-CN" altLang="en-US"/>
           </a:p>
@@ -1954,7 +1954,7 @@
             <a:fld id="{530820CF-B880-4189-942D-D702A7CBA730}" type="datetimeFigureOut">
               <a:rPr lang="zh-CN" altLang="en-US" smtClean="0"/>
               <a:pPr/>
-              <a:t>2015/7/12</a:t>
+              <a:t>2015/7/13</a:t>
             </a:fld>
             <a:endParaRPr lang="zh-CN" altLang="en-US"/>
           </a:p>
@@ -2228,7 +2228,7 @@
             <a:fld id="{530820CF-B880-4189-942D-D702A7CBA730}" type="datetimeFigureOut">
               <a:rPr lang="zh-CN" altLang="en-US" smtClean="0"/>
               <a:pPr/>
-              <a:t>2015/7/12</a:t>
+              <a:t>2015/7/13</a:t>
             </a:fld>
             <a:endParaRPr lang="zh-CN" altLang="en-US"/>
           </a:p>
@@ -2478,7 +2478,7 @@
             <a:fld id="{530820CF-B880-4189-942D-D702A7CBA730}" type="datetimeFigureOut">
               <a:rPr lang="zh-CN" altLang="en-US" smtClean="0"/>
               <a:pPr/>
-              <a:t>2015/7/12</a:t>
+              <a:t>2015/7/13</a:t>
             </a:fld>
             <a:endParaRPr lang="zh-CN" altLang="en-US"/>
           </a:p>
@@ -2688,7 +2688,7 @@
             <a:fld id="{530820CF-B880-4189-942D-D702A7CBA730}" type="datetimeFigureOut">
               <a:rPr lang="zh-CN" altLang="en-US" smtClean="0"/>
               <a:pPr/>
-              <a:t>2015/7/12</a:t>
+              <a:t>2015/7/13</a:t>
             </a:fld>
             <a:endParaRPr lang="zh-CN" altLang="en-US"/>
           </a:p>
@@ -3061,7 +3061,7 @@
       </p:grpSpPr>
       <p:grpSp>
         <p:nvGrpSpPr>
-          <p:cNvPr id="46" name="组合 45"/>
+          <p:cNvPr id="41" name="组合 40"/>
           <p:cNvGrpSpPr/>
           <p:nvPr/>
         </p:nvGrpSpPr>
@@ -3142,8 +3142,8 @@
           </p:nvSpPr>
           <p:spPr>
             <a:xfrm>
-              <a:off x="251600" y="3825104"/>
-              <a:ext cx="720000" cy="540000"/>
+              <a:off x="306000" y="3789040"/>
+              <a:ext cx="630000" cy="540000"/>
             </a:xfrm>
             <a:prstGeom prst="roundRect">
               <a:avLst/>
@@ -3267,9 +3267,9 @@
           </p:nvGrpSpPr>
           <p:grpSpPr>
             <a:xfrm>
-              <a:off x="1440000" y="3177032"/>
+              <a:off x="1440000" y="3140968"/>
               <a:ext cx="1260000" cy="1836144"/>
-              <a:chOff x="1440000" y="3177032"/>
+              <a:chOff x="1440000" y="3140968"/>
               <a:chExt cx="1260000" cy="1836144"/>
             </a:xfrm>
           </p:grpSpPr>
@@ -3281,7 +3281,7 @@
             </p:nvSpPr>
             <p:spPr>
               <a:xfrm>
-                <a:off x="1440000" y="3177032"/>
+                <a:off x="1440000" y="3140968"/>
                 <a:ext cx="1260000" cy="540000"/>
               </a:xfrm>
               <a:prstGeom prst="roundRect">
@@ -3330,7 +3330,7 @@
             </p:nvSpPr>
             <p:spPr>
               <a:xfrm>
-                <a:off x="1440000" y="3825104"/>
+                <a:off x="1440000" y="3789040"/>
                 <a:ext cx="1260000" cy="540000"/>
               </a:xfrm>
               <a:prstGeom prst="roundRect">
@@ -3379,7 +3379,7 @@
             </p:nvSpPr>
             <p:spPr>
               <a:xfrm>
-                <a:off x="1440000" y="4473176"/>
+                <a:off x="1440000" y="4437112"/>
                 <a:ext cx="1260000" cy="540000"/>
               </a:xfrm>
               <a:prstGeom prst="roundRect">
@@ -3792,8 +3792,8 @@
           </p:nvSpPr>
           <p:spPr>
             <a:xfrm>
-              <a:off x="7552470" y="3825104"/>
-              <a:ext cx="1260000" cy="540000"/>
+              <a:off x="7632792" y="3789040"/>
+              <a:ext cx="1080000" cy="540000"/>
             </a:xfrm>
             <a:prstGeom prst="roundRect">
               <a:avLst/>

</xml_diff>